<commit_message>
Added some pipeline intro slides
</commit_message>
<xml_diff>
--- a/presentation_1-1.pptx
+++ b/presentation_1-1.pptx
@@ -5,7 +5,7 @@
     <p:sldMasterId id="2147483648" r:id="rId1"/>
   </p:sldMasterIdLst>
   <p:notesMasterIdLst>
-    <p:notesMasterId r:id="rId14"/>
+    <p:notesMasterId r:id="rId18"/>
   </p:notesMasterIdLst>
   <p:sldIdLst>
     <p:sldId id="332" r:id="rId2"/>
@@ -17,9 +17,13 @@
     <p:sldId id="274" r:id="rId8"/>
     <p:sldId id="275" r:id="rId9"/>
     <p:sldId id="300" r:id="rId10"/>
-    <p:sldId id="327" r:id="rId11"/>
-    <p:sldId id="335" r:id="rId12"/>
-    <p:sldId id="296" r:id="rId13"/>
+    <p:sldId id="337" r:id="rId11"/>
+    <p:sldId id="338" r:id="rId12"/>
+    <p:sldId id="339" r:id="rId13"/>
+    <p:sldId id="340" r:id="rId14"/>
+    <p:sldId id="327" r:id="rId15"/>
+    <p:sldId id="335" r:id="rId16"/>
+    <p:sldId id="296" r:id="rId17"/>
   </p:sldIdLst>
   <p:sldSz cx="13004800" cy="9753600"/>
   <p:notesSz cx="6858000" cy="9144000"/>
@@ -614,13 +618,13 @@
           <a:lstStyle/>
           <a:p>
             <a:r>
-              <a:rPr lang="en-US" dirty="0" smtClean="0"/>
+              <a:rPr lang="en-US" dirty="0"/>
               <a:t>Much can be learned from collections of variants in large populations. Newer datasets have additionally enabled the identification of novel variants, accurate estimation of allele frequencies, and stratification by ancestral population groups.</a:t>
             </a:r>
           </a:p>
           <a:p>
             <a:r>
-              <a:rPr lang="en-US" dirty="0" smtClean="0"/>
+              <a:rPr lang="en-US" dirty="0"/>
               <a:t>The clinical utility of carefully cataloging genetic diversity is clear. Analysis of a personal genome involves evaluating its differences from the normal range of genetic variation. This normal range is inferred by comparison to many other genomes in some database. A variant identified as disease-causing or protein-knockout can be searched up in such a database to find how common it is. Variants that are very common (relative to disease prevalence) may be dismissed as uninformative. Rare variants, on the other hand, are often considered to be highly penetrant.</a:t>
             </a:r>
           </a:p>
@@ -702,21 +706,21 @@
           <a:lstStyle/>
           <a:p>
             <a:r>
-              <a:rPr lang="en-US" b="1" dirty="0" smtClean="0"/>
+              <a:rPr lang="en-US" b="1" dirty="0"/>
               <a:t>Sample size</a:t>
             </a:r>
             <a:r>
-              <a:rPr lang="en-US" dirty="0" smtClean="0"/>
+              <a:rPr lang="en-US" dirty="0"/>
               <a:t>: The rise of next-generation sequencing has enabled the collection of massive amounts of data. Rapid improvements to efficiency, speed, and cost have increased the number of sequenced genomes and exomes documented in public databases. This has allowed unprecedented resolution for estimating allele frequencies, as well as identifying new variants.</a:t>
             </a:r>
           </a:p>
           <a:p>
             <a:r>
-              <a:rPr lang="en-US" b="1" dirty="0" smtClean="0"/>
+              <a:rPr lang="en-US" b="1" dirty="0"/>
               <a:t>Data aggregation</a:t>
             </a:r>
             <a:r>
-              <a:rPr lang="en-US" dirty="0" smtClean="0"/>
+              <a:rPr lang="en-US" dirty="0"/>
               <a:t>: Combining data across a large number of studies is an efficient way to increase the sample size of a genomic database. However, uniform processing and other corrections are needed to account for issues like variable coverage and reference bias. Groups like the MacArthur Lab, which assembled the ExAC and gnomAD databases, have developed a number of techniques for effectively managing and processing exome data in the past few years. In the future, efforts of similar methods and scale could be performed for genomes as well.</a:t>
             </a:r>
           </a:p>
@@ -856,82 +860,81 @@
           <a:lstStyle/>
           <a:p>
             <a:r>
-              <a:rPr lang="en-US" dirty="0" smtClean="0"/>
+              <a:rPr lang="en-US" dirty="0"/>
               <a:t>Online browser and API access are not straightforward for users interested in using their own variant call files (VCFs) to retrieve a slice from a very large database. We propose a tool, </a:t>
             </a:r>
             <a:r>
-              <a:rPr lang="en-US" dirty="0" err="1" smtClean="0"/>
+              <a:rPr lang="en-US" dirty="0" err="1"/>
               <a:t>vcfR</a:t>
             </a:r>
             <a:r>
-              <a:rPr lang="en-US" dirty="0" smtClean="0"/>
+              <a:rPr lang="en-US" dirty="0"/>
               <a:t>, to help users to use VCFs to query certain variants within a reference dataset. The reference can be a standalone file or a link. The reference can be customized and the searching process is fast given proper reference and sorted order of query by genome position. The usage of </a:t>
             </a:r>
             <a:r>
-              <a:rPr lang="en-US" dirty="0" err="1" smtClean="0"/>
+              <a:rPr lang="en-US" dirty="0" err="1"/>
               <a:t>vcfR</a:t>
             </a:r>
             <a:r>
-              <a:rPr lang="en-US" dirty="0" smtClean="0"/>
+              <a:rPr lang="en-US" dirty="0"/>
               <a:t> is as follows: python </a:t>
             </a:r>
             <a:r>
-              <a:rPr lang="en-US" dirty="0" err="1" smtClean="0"/>
+              <a:rPr lang="en-US" dirty="0" err="1"/>
               <a:t>vcfR.py</a:t>
             </a:r>
             <a:r>
-              <a:rPr lang="en-US" dirty="0" smtClean="0"/>
+              <a:rPr lang="en-US" dirty="0"/>
               <a:t> -</a:t>
             </a:r>
             <a:r>
-              <a:rPr lang="en-US" dirty="0" err="1" smtClean="0"/>
+              <a:rPr lang="en-US" dirty="0" err="1"/>
               <a:t>i</a:t>
             </a:r>
             <a:r>
-              <a:rPr lang="en-US" dirty="0" smtClean="0"/>
+              <a:rPr lang="en-US" dirty="0"/>
               <a:t> &lt;</a:t>
             </a:r>
             <a:r>
-              <a:rPr lang="en-US" dirty="0" err="1" smtClean="0"/>
+              <a:rPr lang="en-US" dirty="0" err="1"/>
               <a:t>input.vcf</a:t>
             </a:r>
             <a:r>
-              <a:rPr lang="en-US" dirty="0" smtClean="0"/>
+              <a:rPr lang="en-US" dirty="0"/>
               <a:t>&gt; -f &lt;</a:t>
             </a:r>
             <a:r>
-              <a:rPr lang="en-US" dirty="0" err="1" smtClean="0"/>
+              <a:rPr lang="en-US" dirty="0" err="1"/>
               <a:t>ref.vcf.gz</a:t>
             </a:r>
             <a:r>
-              <a:rPr lang="en-US" dirty="0" smtClean="0"/>
+              <a:rPr lang="en-US" dirty="0"/>
               <a:t>&gt; -o &lt;</a:t>
             </a:r>
             <a:r>
-              <a:rPr lang="en-US" dirty="0" err="1" smtClean="0"/>
+              <a:rPr lang="en-US" dirty="0" err="1"/>
               <a:t>output.vcf</a:t>
             </a:r>
             <a:r>
-              <a:rPr lang="en-US" dirty="0" smtClean="0"/>
+              <a:rPr lang="en-US" dirty="0"/>
               <a:t>&gt; The matched terms in input file will be output to a file named </a:t>
             </a:r>
             <a:r>
-              <a:rPr lang="en-US" dirty="0" err="1" smtClean="0"/>
+              <a:rPr lang="en-US" dirty="0" err="1"/>
               <a:t>input_matched.file</a:t>
             </a:r>
             <a:r>
-              <a:rPr lang="en-US" dirty="0" smtClean="0"/>
+              <a:rPr lang="en-US" dirty="0"/>
               <a:t> in case of the comparison between matches and output. As mentioned earlier, </a:t>
             </a:r>
             <a:r>
-              <a:rPr lang="en-US" dirty="0" err="1" smtClean="0"/>
+              <a:rPr lang="en-US" dirty="0" err="1"/>
               <a:t>vcfR</a:t>
             </a:r>
             <a:r>
-              <a:rPr lang="en-US" dirty="0" smtClean="0"/>
+              <a:rPr lang="en-US" dirty="0"/>
               <a:t> can also deal with online reference, e.g., to query chr1 variants in 1000 Genomes and gnomAD:</a:t>
             </a:r>
-            <a:endParaRPr lang="en-US" dirty="0"/>
           </a:p>
         </p:txBody>
       </p:sp>
@@ -993,42 +996,41 @@
           <a:lstStyle/>
           <a:p>
             <a:r>
-              <a:rPr lang="en-US" dirty="0" smtClean="0"/>
+              <a:rPr lang="en-US" dirty="0"/>
               <a:t>All the annotations will be saved into a </a:t>
             </a:r>
             <a:r>
-              <a:rPr lang="en-US" dirty="0" err="1" smtClean="0"/>
+              <a:rPr lang="en-US" dirty="0" err="1"/>
               <a:t>js</a:t>
             </a:r>
             <a:r>
-              <a:rPr lang="en-US" dirty="0" smtClean="0"/>
+              <a:rPr lang="en-US" dirty="0"/>
               <a:t> on file named “</a:t>
             </a:r>
             <a:r>
-              <a:rPr lang="en-US" dirty="0" err="1" smtClean="0"/>
+              <a:rPr lang="en-US" dirty="0" err="1"/>
               <a:t>sample_input_matched.json</a:t>
             </a:r>
             <a:r>
-              <a:rPr lang="en-US" dirty="0" smtClean="0"/>
+              <a:rPr lang="en-US" dirty="0"/>
               <a:t>”. It would be easy to use tools or simple codes dealing with JSON files to get annotations. In this case, 854 variants are matched in gnomAD. Users are able to retrieve information after simple processing of the JSON file, for example, 190 variants in coding region are identified and the type of sequence variants is recorded, for example, chr1:g.12783G&gt;A : </a:t>
             </a:r>
             <a:r>
-              <a:rPr lang="en-US" dirty="0" err="1" smtClean="0"/>
+              <a:rPr lang="en-US" dirty="0" err="1"/>
               <a:t>intron_variant</a:t>
             </a:r>
             <a:r>
-              <a:rPr lang="en-US" dirty="0" smtClean="0"/>
+              <a:rPr lang="en-US" dirty="0"/>
               <a:t>, chr1:g.14464A&gt;T : </a:t>
             </a:r>
             <a:r>
-              <a:rPr lang="en-US" dirty="0" err="1" smtClean="0"/>
+              <a:rPr lang="en-US" dirty="0" err="1"/>
               <a:t>non_coding_transcript_exon_variant</a:t>
             </a:r>
             <a:r>
-              <a:rPr lang="en-US" dirty="0" smtClean="0"/>
+              <a:rPr lang="en-US" dirty="0"/>
               <a:t>…</a:t>
             </a:r>
-            <a:endParaRPr lang="en-US" dirty="0"/>
           </a:p>
         </p:txBody>
       </p:sp>
@@ -1090,15 +1092,15 @@
           <a:lstStyle/>
           <a:p>
             <a:r>
-              <a:rPr lang="en-US" dirty="0" err="1" smtClean="0"/>
+              <a:rPr lang="en-US" dirty="0" err="1"/>
               <a:t>llele</a:t>
             </a:r>
             <a:r>
-              <a:rPr lang="en-US" dirty="0" smtClean="0"/>
+              <a:rPr lang="en-US" dirty="0"/>
               <a:t> frequencies were collected variants in both 1000 Genomes and in gnomAD</a:t>
             </a:r>
             <a:r>
-              <a:rPr lang="en-US" baseline="0" dirty="0" smtClean="0"/>
+              <a:rPr lang="en-US" baseline="0" dirty="0"/>
               <a:t> using ANNOVAR. </a:t>
             </a:r>
             <a:endParaRPr lang="en-US" dirty="0"/>
@@ -1163,29 +1165,29 @@
           <a:lstStyle/>
           <a:p>
             <a:r>
-              <a:rPr lang="en-US" dirty="0" smtClean="0"/>
+              <a:rPr lang="en-US" dirty="0"/>
               <a:t>A comparison of </a:t>
             </a:r>
             <a:r>
-              <a:rPr lang="en-US" dirty="0" err="1" smtClean="0"/>
+              <a:rPr lang="en-US" dirty="0" err="1"/>
               <a:t>subjectZ</a:t>
             </a:r>
             <a:r>
-              <a:rPr lang="en-US" dirty="0" smtClean="0"/>
+              <a:rPr lang="en-US" dirty="0"/>
               <a:t> (Carl) with all individuals in 1000 Genomes: 95% of the SNPs (~3.4M) and 60% of the indels (469K) were found in at least 1 other individual. This leaves 5% of the SNPs (~178K) and 40% of the indels (320K) as private variants.</a:t>
             </a:r>
           </a:p>
           <a:p>
             <a:r>
-              <a:rPr lang="en-US" dirty="0" smtClean="0"/>
+              <a:rPr lang="en-US" dirty="0"/>
               <a:t>A comparison of </a:t>
             </a:r>
             <a:r>
-              <a:rPr lang="en-US" dirty="0" err="1" smtClean="0"/>
+              <a:rPr lang="en-US" dirty="0" err="1"/>
               <a:t>subjectZ</a:t>
             </a:r>
             <a:r>
-              <a:rPr lang="en-US" dirty="0" smtClean="0"/>
+              <a:rPr lang="en-US" dirty="0"/>
               <a:t> with all individuals in gnomAD: 97.5% of the SNPs (~3.5M) and 90% of the indels (709K) were found in at least 1 other individual. This leaves 2.5% of the SNPs (~82K) and 10% of the indels (81K) as private variants.</a:t>
             </a:r>
           </a:p>
@@ -1252,10 +1254,9 @@
           <a:lstStyle/>
           <a:p>
             <a:r>
-              <a:rPr lang="en-US" dirty="0" smtClean="0"/>
+              <a:rPr lang="en-US" dirty="0"/>
               <a:t>A comparative analysis of Carl’s personal genome is useful for finding which variants are functionally important, and how common those variants are. Here, we have developed tools and a pipeline for retrieving information on Carl’s personal variants. Although the variants were too numerous to collect annotations on all of them in our time frame, we demonstrate that, based on the gnomAD dataset, 2.5% of Carl’s SNPs and 10% of his indels are private variants. Additionally, our pipeline is able to collect allele frequency data for non-private variants. From here, it would not be a difficult next step to identify pathogenic annotations of shared variants as candidates for clinical reporting.</a:t>
             </a:r>
-            <a:endParaRPr lang="en-US" dirty="0"/>
           </a:p>
         </p:txBody>
       </p:sp>
@@ -3034,10 +3035,9 @@
           <a:lstStyle/>
           <a:p>
             <a:r>
-              <a:rPr lang="en-US" smtClean="0"/>
+              <a:rPr lang="en-US"/>
               <a:t>Click to edit Master title style</a:t>
             </a:r>
-            <a:endParaRPr lang="en-US"/>
           </a:p>
         </p:txBody>
       </p:sp>
@@ -3058,38 +3058,37 @@
           <a:p>
             <a:pPr lvl="0"/>
             <a:r>
-              <a:rPr lang="en-US" smtClean="0"/>
+              <a:rPr lang="en-US"/>
               <a:t>Click to edit Master text styles</a:t>
             </a:r>
           </a:p>
           <a:p>
             <a:pPr lvl="1"/>
             <a:r>
-              <a:rPr lang="en-US" smtClean="0"/>
+              <a:rPr lang="en-US"/>
               <a:t>Second level</a:t>
             </a:r>
           </a:p>
           <a:p>
             <a:pPr lvl="2"/>
             <a:r>
-              <a:rPr lang="en-US" smtClean="0"/>
+              <a:rPr lang="en-US"/>
               <a:t>Third level</a:t>
             </a:r>
           </a:p>
           <a:p>
             <a:pPr lvl="3"/>
             <a:r>
-              <a:rPr lang="en-US" smtClean="0"/>
+              <a:rPr lang="en-US"/>
               <a:t>Fourth level</a:t>
             </a:r>
           </a:p>
           <a:p>
             <a:pPr lvl="4"/>
             <a:r>
-              <a:rPr lang="en-US" smtClean="0"/>
+              <a:rPr lang="en-US"/>
               <a:t>Fifth level</a:t>
             </a:r>
-            <a:endParaRPr lang="en-US"/>
           </a:p>
         </p:txBody>
       </p:sp>
@@ -3118,7 +3117,7 @@
           <a:p>
             <a:fld id="{3CBAF2EB-5125-A14D-8ADA-E21F7A3A5310}" type="datetimeFigureOut">
               <a:rPr lang="en-US" smtClean="0"/>
-              <a:t>5/11/17</a:t>
+              <a:t>11-May-17</a:t>
             </a:fld>
             <a:endParaRPr lang="en-US"/>
           </a:p>
@@ -4416,7 +4415,7 @@
           </a:ln>
           <a:extLst>
             <a:ext uri="{C572A759-6A51-4108-AA02-DFA0A04FC94B}">
-              <ma14:wrappingTextBoxFlag xmlns:ma14="http://schemas.microsoft.com/office/mac/drawingml/2011/main" val="1"/>
+              <ma14:wrappingTextBoxFlag xmlns:ma14="http://schemas.microsoft.com/office/mac/drawingml/2011/main" xmlns="" val="1"/>
             </a:ext>
           </a:extLst>
         </p:spPr>
@@ -4528,7 +4527,7 @@
           </a:ln>
           <a:extLst>
             <a:ext uri="{C572A759-6A51-4108-AA02-DFA0A04FC94B}">
-              <ma14:wrappingTextBoxFlag xmlns:ma14="http://schemas.microsoft.com/office/mac/drawingml/2011/main" val="1"/>
+              <ma14:wrappingTextBoxFlag xmlns:ma14="http://schemas.microsoft.com/office/mac/drawingml/2011/main" xmlns="" val="1"/>
             </a:ext>
           </a:extLst>
         </p:spPr>
@@ -5436,38 +5435,22 @@
               </a:defRPr>
             </a:pPr>
             <a:r>
-              <a:rPr lang="en-US" b="1" dirty="0" smtClean="0">
+              <a:rPr lang="en-US" b="1" dirty="0">
                 <a:solidFill>
                   <a:schemeClr val="accent1"/>
                 </a:solidFill>
               </a:rPr>
-              <a:t>Part </a:t>
-            </a:r>
-            <a:r>
-              <a:rPr lang="en-US" b="1" dirty="0" smtClean="0">
-                <a:solidFill>
-                  <a:schemeClr val="accent1"/>
-                </a:solidFill>
-              </a:rPr>
-              <a:t>1.1</a:t>
-            </a:r>
-            <a:r>
-              <a:rPr lang="en-US" b="1" dirty="0" smtClean="0">
-                <a:solidFill>
-                  <a:schemeClr val="accent1"/>
-                </a:solidFill>
-              </a:rPr>
-              <a:t/>
+              <a:t>Part 1.1</a:t>
             </a:r>
             <a:br>
-              <a:rPr lang="en-US" b="1" dirty="0" smtClean="0">
+              <a:rPr lang="en-US" b="1" dirty="0">
                 <a:solidFill>
                   <a:schemeClr val="accent1"/>
                 </a:solidFill>
               </a:rPr>
             </a:br>
             <a:r>
-              <a:rPr lang="en-US" b="0" dirty="0" smtClean="0">
+              <a:rPr lang="en-US" b="0" dirty="0">
                 <a:solidFill>
                   <a:schemeClr val="accent1"/>
                 </a:solidFill>
@@ -5510,44 +5493,44 @@
             <a:pPr defTabSz="554990">
               <a:defRPr sz="3609" b="1"/>
             </a:pPr>
-            <a:endParaRPr lang="en-US" dirty="0" smtClean="0"/>
+            <a:endParaRPr lang="en-US" dirty="0"/>
           </a:p>
           <a:p>
             <a:pPr defTabSz="554990">
               <a:defRPr sz="3609" b="1"/>
             </a:pPr>
             <a:r>
-              <a:rPr lang="en-US" dirty="0" smtClean="0"/>
+              <a:rPr lang="en-US" dirty="0"/>
               <a:t>James Diao, </a:t>
             </a:r>
             <a:r>
-              <a:rPr lang="en-US" dirty="0" err="1" smtClean="0"/>
+              <a:rPr lang="en-US" dirty="0" err="1"/>
               <a:t>Dingjue</a:t>
             </a:r>
             <a:r>
-              <a:rPr lang="en-US" dirty="0" smtClean="0"/>
+              <a:rPr lang="en-US" dirty="0"/>
               <a:t> Ji, and </a:t>
             </a:r>
             <a:r>
-              <a:rPr lang="en-US" dirty="0" err="1" smtClean="0"/>
+              <a:rPr lang="en-US" dirty="0" err="1"/>
               <a:t>Nir</a:t>
             </a:r>
             <a:r>
-              <a:rPr lang="en-US" dirty="0" smtClean="0"/>
+              <a:rPr lang="en-US" dirty="0"/>
               <a:t> </a:t>
             </a:r>
             <a:r>
-              <a:rPr lang="en-US" dirty="0" err="1" smtClean="0"/>
+              <a:rPr lang="en-US" dirty="0" err="1"/>
               <a:t>Neumark</a:t>
             </a:r>
-            <a:endParaRPr lang="en-US" dirty="0" smtClean="0"/>
+            <a:endParaRPr lang="en-US" dirty="0"/>
           </a:p>
           <a:p>
             <a:pPr defTabSz="554990">
               <a:defRPr sz="3135" b="1"/>
             </a:pPr>
             <a:r>
-              <a:rPr lang="en-US" dirty="0" smtClean="0"/>
+              <a:rPr lang="en-US" dirty="0"/>
               <a:t>Yale University </a:t>
             </a:r>
             <a:endParaRPr dirty="0"/>
@@ -5558,11 +5541,7 @@
             </a:pPr>
             <a:r>
               <a:rPr lang="en-US" dirty="0"/>
-              <a:t>9</a:t>
-            </a:r>
-            <a:r>
-              <a:rPr lang="en-US" dirty="0" smtClean="0"/>
-              <a:t> May 2017</a:t>
+              <a:t>9 May 2017</a:t>
             </a:r>
             <a:endParaRPr dirty="0"/>
           </a:p>
@@ -5590,7 +5569,7 @@
           </a:ln>
           <a:extLst>
             <a:ext uri="{C572A759-6A51-4108-AA02-DFA0A04FC94B}">
-              <ma14:wrappingTextBoxFlag xmlns:ma14="http://schemas.microsoft.com/office/mac/drawingml/2011/main" val="1"/>
+              <ma14:wrappingTextBoxFlag xmlns:ma14="http://schemas.microsoft.com/office/mac/drawingml/2011/main" xmlns="" val="1"/>
             </a:ext>
           </a:extLst>
         </p:spPr>
@@ -5647,13 +5626,6 @@
     <a:masterClrMapping/>
   </p:clrMapOvr>
   <p:transition spd="med"/>
-  <p:timing>
-    <p:tnLst>
-      <p:par>
-        <p:cTn id="1" dur="indefinite" restart="never" nodeType="tmRoot"/>
-      </p:par>
-    </p:tnLst>
-  </p:timing>
 </p:sld>
 </file>
 
@@ -5676,6 +5648,795 @@
       </p:grpSpPr>
       <p:sp>
         <p:nvSpPr>
+          <p:cNvPr id="2" name="Title 1"/>
+          <p:cNvSpPr>
+            <a:spLocks noGrp="1"/>
+          </p:cNvSpPr>
+          <p:nvPr>
+            <p:ph type="title"/>
+          </p:nvPr>
+        </p:nvSpPr>
+        <p:spPr>
+          <a:xfrm>
+            <a:off x="0" y="119482"/>
+            <a:ext cx="13004800" cy="1904468"/>
+          </a:xfrm>
+        </p:spPr>
+        <p:txBody>
+          <a:bodyPr/>
+          <a:lstStyle/>
+          <a:p>
+            <a:r>
+              <a:rPr lang="en-US" dirty="0"/>
+              <a:t>ANNOVAR</a:t>
+            </a:r>
+          </a:p>
+        </p:txBody>
+      </p:sp>
+      <p:sp>
+        <p:nvSpPr>
+          <p:cNvPr id="3" name="TextBox 2"/>
+          <p:cNvSpPr txBox="1"/>
+          <p:nvPr/>
+        </p:nvSpPr>
+        <p:spPr>
+          <a:xfrm>
+            <a:off x="794774" y="2306390"/>
+            <a:ext cx="11415252" cy="4503797"/>
+          </a:xfrm>
+          <a:prstGeom prst="rect">
+            <a:avLst/>
+          </a:prstGeom>
+          <a:noFill/>
+          <a:ln w="12700" cap="flat">
+            <a:noFill/>
+            <a:miter lim="400000"/>
+          </a:ln>
+          <a:effectLst/>
+          <a:sp3d/>
+        </p:spPr>
+        <p:style>
+          <a:lnRef idx="0">
+            <a:scrgbClr r="0" g="0" b="0"/>
+          </a:lnRef>
+          <a:fillRef idx="0">
+            <a:scrgbClr r="0" g="0" b="0"/>
+          </a:fillRef>
+          <a:effectRef idx="0">
+            <a:scrgbClr r="0" g="0" b="0"/>
+          </a:effectRef>
+          <a:fontRef idx="none"/>
+        </p:style>
+        <p:txBody>
+          <a:bodyPr rot="0" spcFirstLastPara="1" vertOverflow="overflow" horzOverflow="overflow" vert="horz" wrap="square" lIns="50800" tIns="50800" rIns="50800" bIns="50800" numCol="1" spcCol="38100" rtlCol="0" anchor="ctr">
+            <a:spAutoFit/>
+          </a:bodyPr>
+          <a:lstStyle/>
+          <a:p>
+            <a:pPr marL="457200" indent="-457200" algn="l">
+              <a:buFont typeface="Arial" panose="020B0604020202020204" pitchFamily="34" charset="0"/>
+              <a:buChar char="•"/>
+            </a:pPr>
+            <a:r>
+              <a:rPr lang="en-US" dirty="0"/>
+              <a:t>Pinpointing a small subset of functionally important variants</a:t>
+            </a:r>
+          </a:p>
+          <a:p>
+            <a:pPr marL="457200" indent="-457200" algn="l">
+              <a:buFont typeface="Arial" panose="020B0604020202020204" pitchFamily="34" charset="0"/>
+              <a:buChar char="•"/>
+            </a:pPr>
+            <a:r>
+              <a:rPr lang="en-US" dirty="0"/>
+              <a:t>Mutation prediction approach for annotation</a:t>
+            </a:r>
+          </a:p>
+          <a:p>
+            <a:pPr marL="457200" indent="-457200" algn="l">
+              <a:buFont typeface="Arial" panose="020B0604020202020204" pitchFamily="34" charset="0"/>
+              <a:buChar char="•"/>
+            </a:pPr>
+            <a:r>
+              <a:rPr lang="en-US" dirty="0"/>
+              <a:t>Identify subsets of variants based on comparison to other variant databases:			</a:t>
+            </a:r>
+          </a:p>
+          <a:p>
+            <a:pPr marL="457200" lvl="4" indent="-457200" algn="l">
+              <a:buFont typeface="Arial" panose="020B0604020202020204" pitchFamily="34" charset="0"/>
+              <a:buChar char="•"/>
+            </a:pPr>
+            <a:endParaRPr lang="en-US" dirty="0"/>
+          </a:p>
+          <a:p>
+            <a:pPr marL="457200" lvl="8" indent="-457200" algn="l">
+              <a:buFont typeface="Arial" panose="020B0604020202020204" pitchFamily="34" charset="0"/>
+              <a:buChar char="•"/>
+            </a:pPr>
+            <a:r>
+              <a:rPr lang="en-US" dirty="0"/>
+              <a:t>     </a:t>
+            </a:r>
+            <a:r>
+              <a:rPr lang="en-US" dirty="0" err="1"/>
+              <a:t>dbSNP</a:t>
+            </a:r>
+            <a:r>
+              <a:rPr lang="en-US" dirty="0"/>
+              <a:t> </a:t>
+            </a:r>
+          </a:p>
+          <a:p>
+            <a:pPr marL="457200" lvl="5" indent="-457200" algn="l">
+              <a:buFont typeface="Arial" panose="020B0604020202020204" pitchFamily="34" charset="0"/>
+              <a:buChar char="•"/>
+            </a:pPr>
+            <a:r>
+              <a:rPr lang="en-US" dirty="0"/>
+              <a:t>     1000 Genome Project</a:t>
+            </a:r>
+          </a:p>
+          <a:p>
+            <a:pPr marL="457200" lvl="3" indent="-457200" algn="l">
+              <a:buFont typeface="Arial" panose="020B0604020202020204" pitchFamily="34" charset="0"/>
+              <a:buChar char="•"/>
+            </a:pPr>
+            <a:r>
+              <a:rPr lang="en-US" dirty="0"/>
+              <a:t>      </a:t>
+            </a:r>
+            <a:r>
+              <a:rPr lang="en-US" dirty="0" err="1"/>
+              <a:t>gnomAD</a:t>
+            </a:r>
+            <a:r>
+              <a:rPr lang="en-US" dirty="0"/>
+              <a:t> -  </a:t>
+            </a:r>
+            <a:r>
+              <a:rPr lang="en-US" dirty="0">
+                <a:hlinkClick r:id="rId2"/>
+              </a:rPr>
+              <a:t>Genome Aggregation Database</a:t>
+            </a:r>
+            <a:r>
+              <a:rPr lang="en-US" dirty="0"/>
+              <a:t> </a:t>
+            </a:r>
+          </a:p>
+          <a:p>
+            <a:pPr marL="457200" lvl="3" indent="-457200" algn="l">
+              <a:buFont typeface="Arial" panose="020B0604020202020204" pitchFamily="34" charset="0"/>
+              <a:buChar char="•"/>
+            </a:pPr>
+            <a:endParaRPr lang="en-US" dirty="0"/>
+          </a:p>
+          <a:p>
+            <a:pPr marL="457200" lvl="3" indent="-457200" algn="l">
+              <a:buFont typeface="Arial" panose="020B0604020202020204" pitchFamily="34" charset="0"/>
+              <a:buChar char="•"/>
+            </a:pPr>
+            <a:r>
+              <a:rPr lang="en-US" dirty="0"/>
+              <a:t>Pipeline: Download -&gt; Convert -&gt; Analyze</a:t>
+            </a:r>
+          </a:p>
+          <a:p>
+            <a:pPr marL="457200" lvl="4" indent="-457200" algn="l">
+              <a:buFont typeface="Arial" panose="020B0604020202020204" pitchFamily="34" charset="0"/>
+              <a:buChar char="•"/>
+            </a:pPr>
+            <a:endParaRPr lang="en-US" dirty="0"/>
+          </a:p>
+        </p:txBody>
+      </p:sp>
+    </p:spTree>
+    <p:extLst>
+      <p:ext uri="{BB962C8B-B14F-4D97-AF65-F5344CB8AC3E}">
+        <p14:creationId xmlns:p14="http://schemas.microsoft.com/office/powerpoint/2010/main" val="3240532848"/>
+      </p:ext>
+    </p:extLst>
+  </p:cSld>
+  <p:clrMapOvr>
+    <a:masterClrMapping/>
+  </p:clrMapOvr>
+  <p:transition spd="med"/>
+</p:sld>
+</file>
+
+<file path=ppt/slides/slide11.xml><?xml version="1.0" encoding="utf-8"?>
+<p:sld xmlns:a="http://schemas.openxmlformats.org/drawingml/2006/main" xmlns:r="http://schemas.openxmlformats.org/officeDocument/2006/relationships" xmlns:p="http://schemas.openxmlformats.org/presentationml/2006/main">
+  <p:cSld>
+    <p:spTree>
+      <p:nvGrpSpPr>
+        <p:cNvPr id="1" name=""/>
+        <p:cNvGrpSpPr/>
+        <p:nvPr/>
+      </p:nvGrpSpPr>
+      <p:grpSpPr>
+        <a:xfrm>
+          <a:off x="0" y="0"/>
+          <a:ext cx="0" cy="0"/>
+          <a:chOff x="0" y="0"/>
+          <a:chExt cx="0" cy="0"/>
+        </a:xfrm>
+      </p:grpSpPr>
+      <p:sp>
+        <p:nvSpPr>
+          <p:cNvPr id="2" name="Title 1"/>
+          <p:cNvSpPr>
+            <a:spLocks noGrp="1"/>
+          </p:cNvSpPr>
+          <p:nvPr>
+            <p:ph type="title"/>
+          </p:nvPr>
+        </p:nvSpPr>
+        <p:spPr>
+          <a:xfrm>
+            <a:off x="0" y="119482"/>
+            <a:ext cx="13004800" cy="1904468"/>
+          </a:xfrm>
+        </p:spPr>
+        <p:txBody>
+          <a:bodyPr/>
+          <a:lstStyle/>
+          <a:p>
+            <a:r>
+              <a:rPr lang="en-US" dirty="0"/>
+              <a:t>Download</a:t>
+            </a:r>
+            <a:endParaRPr lang="en-US" dirty="0"/>
+          </a:p>
+        </p:txBody>
+      </p:sp>
+      <p:sp>
+        <p:nvSpPr>
+          <p:cNvPr id="3" name="TextBox 2"/>
+          <p:cNvSpPr txBox="1"/>
+          <p:nvPr/>
+        </p:nvSpPr>
+        <p:spPr>
+          <a:xfrm>
+            <a:off x="0" y="3706774"/>
+            <a:ext cx="13004800" cy="1703030"/>
+          </a:xfrm>
+          <a:prstGeom prst="rect">
+            <a:avLst/>
+          </a:prstGeom>
+          <a:noFill/>
+          <a:ln w="12700" cap="flat">
+            <a:noFill/>
+            <a:miter lim="400000"/>
+          </a:ln>
+          <a:effectLst/>
+          <a:sp3d/>
+        </p:spPr>
+        <p:style>
+          <a:lnRef idx="0">
+            <a:scrgbClr r="0" g="0" b="0"/>
+          </a:lnRef>
+          <a:fillRef idx="0">
+            <a:scrgbClr r="0" g="0" b="0"/>
+          </a:fillRef>
+          <a:effectRef idx="0">
+            <a:scrgbClr r="0" g="0" b="0"/>
+          </a:effectRef>
+          <a:fontRef idx="none"/>
+        </p:style>
+        <p:txBody>
+          <a:bodyPr rot="0" spcFirstLastPara="1" vertOverflow="overflow" horzOverflow="overflow" vert="horz" wrap="square" lIns="50800" tIns="50800" rIns="50800" bIns="50800" numCol="1" spcCol="38100" rtlCol="0" anchor="ctr">
+            <a:spAutoFit/>
+          </a:bodyPr>
+          <a:lstStyle/>
+          <a:p>
+            <a:pPr marL="457200" lvl="0" indent="-457200" algn="l">
+              <a:buFont typeface="Arial" panose="020B0604020202020204" pitchFamily="34" charset="0"/>
+              <a:buChar char="•"/>
+            </a:pPr>
+            <a:r>
+              <a:rPr lang="en-US" dirty="0"/>
+              <a:t>annotate_variation.pl -</a:t>
+            </a:r>
+            <a:r>
+              <a:rPr lang="en-US" dirty="0" err="1"/>
+              <a:t>downdb</a:t>
+            </a:r>
+            <a:r>
+              <a:rPr lang="en-US" dirty="0"/>
+              <a:t> 1000g2015aug </a:t>
+            </a:r>
+            <a:r>
+              <a:rPr lang="en-US" dirty="0" err="1"/>
+              <a:t>humandb</a:t>
+            </a:r>
+            <a:r>
+              <a:rPr lang="en-US" dirty="0"/>
+              <a:t> -</a:t>
+            </a:r>
+            <a:r>
+              <a:rPr lang="en-US" dirty="0" err="1"/>
+              <a:t>buildver</a:t>
+            </a:r>
+            <a:r>
+              <a:rPr lang="en-US" dirty="0"/>
+              <a:t> hg19</a:t>
+            </a:r>
+          </a:p>
+          <a:p>
+            <a:pPr marL="457200" indent="-457200" algn="l">
+              <a:buFont typeface="Arial" panose="020B0604020202020204" pitchFamily="34" charset="0"/>
+              <a:buChar char="•"/>
+            </a:pPr>
+            <a:r>
+              <a:rPr lang="en-US" dirty="0"/>
+              <a:t>annotate_variation.pl -</a:t>
+            </a:r>
+            <a:r>
+              <a:rPr lang="en-US" dirty="0" err="1"/>
+              <a:t>buildver</a:t>
+            </a:r>
+            <a:r>
+              <a:rPr lang="en-US" dirty="0"/>
+              <a:t> hg19 -</a:t>
+            </a:r>
+            <a:r>
+              <a:rPr lang="en-US" dirty="0" err="1"/>
+              <a:t>downdb</a:t>
+            </a:r>
+            <a:r>
+              <a:rPr lang="en-US" dirty="0"/>
+              <a:t> -</a:t>
+            </a:r>
+            <a:r>
+              <a:rPr lang="en-US" dirty="0" err="1"/>
+              <a:t>webfrom</a:t>
+            </a:r>
+            <a:r>
+              <a:rPr lang="en-US" dirty="0"/>
+              <a:t> </a:t>
+            </a:r>
+            <a:r>
+              <a:rPr lang="en-US" dirty="0" err="1"/>
+              <a:t>annovar</a:t>
+            </a:r>
+            <a:r>
+              <a:rPr lang="en-US" dirty="0"/>
+              <a:t> </a:t>
+            </a:r>
+            <a:r>
+              <a:rPr lang="en-US" dirty="0" err="1"/>
+              <a:t>gnomad_genome</a:t>
+            </a:r>
+            <a:r>
+              <a:rPr lang="en-US" dirty="0"/>
+              <a:t> </a:t>
+            </a:r>
+            <a:r>
+              <a:rPr lang="en-US" dirty="0" err="1"/>
+              <a:t>humandb</a:t>
+            </a:r>
+            <a:r>
+              <a:rPr lang="en-US" dirty="0"/>
+              <a:t>/</a:t>
+            </a:r>
+          </a:p>
+          <a:p>
+            <a:pPr marL="457200" lvl="0" indent="-457200" algn="l">
+              <a:buFont typeface="Arial" panose="020B0604020202020204" pitchFamily="34" charset="0"/>
+              <a:buChar char="•"/>
+            </a:pPr>
+            <a:endParaRPr lang="en-US" dirty="0"/>
+          </a:p>
+        </p:txBody>
+      </p:sp>
+    </p:spTree>
+    <p:extLst>
+      <p:ext uri="{BB962C8B-B14F-4D97-AF65-F5344CB8AC3E}">
+        <p14:creationId xmlns:p14="http://schemas.microsoft.com/office/powerpoint/2010/main" val="575633727"/>
+      </p:ext>
+    </p:extLst>
+  </p:cSld>
+  <p:clrMapOvr>
+    <a:masterClrMapping/>
+  </p:clrMapOvr>
+  <p:transition spd="med"/>
+</p:sld>
+</file>
+
+<file path=ppt/slides/slide12.xml><?xml version="1.0" encoding="utf-8"?>
+<p:sld xmlns:a="http://schemas.openxmlformats.org/drawingml/2006/main" xmlns:r="http://schemas.openxmlformats.org/officeDocument/2006/relationships" xmlns:p="http://schemas.openxmlformats.org/presentationml/2006/main">
+  <p:cSld>
+    <p:spTree>
+      <p:nvGrpSpPr>
+        <p:cNvPr id="1" name=""/>
+        <p:cNvGrpSpPr/>
+        <p:nvPr/>
+      </p:nvGrpSpPr>
+      <p:grpSpPr>
+        <a:xfrm>
+          <a:off x="0" y="0"/>
+          <a:ext cx="0" cy="0"/>
+          <a:chOff x="0" y="0"/>
+          <a:chExt cx="0" cy="0"/>
+        </a:xfrm>
+      </p:grpSpPr>
+      <p:sp>
+        <p:nvSpPr>
+          <p:cNvPr id="2" name="Title 1"/>
+          <p:cNvSpPr>
+            <a:spLocks noGrp="1"/>
+          </p:cNvSpPr>
+          <p:nvPr>
+            <p:ph type="title"/>
+          </p:nvPr>
+        </p:nvSpPr>
+        <p:spPr>
+          <a:xfrm>
+            <a:off x="0" y="119482"/>
+            <a:ext cx="13004800" cy="1904468"/>
+          </a:xfrm>
+        </p:spPr>
+        <p:txBody>
+          <a:bodyPr/>
+          <a:lstStyle/>
+          <a:p>
+            <a:r>
+              <a:rPr lang="en-US" dirty="0"/>
+              <a:t>VCF conversion</a:t>
+            </a:r>
+            <a:endParaRPr lang="en-US" dirty="0"/>
+          </a:p>
+        </p:txBody>
+      </p:sp>
+      <p:sp>
+        <p:nvSpPr>
+          <p:cNvPr id="3" name="TextBox 2"/>
+          <p:cNvSpPr txBox="1"/>
+          <p:nvPr/>
+        </p:nvSpPr>
+        <p:spPr>
+          <a:xfrm>
+            <a:off x="0" y="3706774"/>
+            <a:ext cx="13004800" cy="1703030"/>
+          </a:xfrm>
+          <a:prstGeom prst="rect">
+            <a:avLst/>
+          </a:prstGeom>
+          <a:noFill/>
+          <a:ln w="12700" cap="flat">
+            <a:noFill/>
+            <a:miter lim="400000"/>
+          </a:ln>
+          <a:effectLst/>
+          <a:sp3d/>
+        </p:spPr>
+        <p:style>
+          <a:lnRef idx="0">
+            <a:scrgbClr r="0" g="0" b="0"/>
+          </a:lnRef>
+          <a:fillRef idx="0">
+            <a:scrgbClr r="0" g="0" b="0"/>
+          </a:fillRef>
+          <a:effectRef idx="0">
+            <a:scrgbClr r="0" g="0" b="0"/>
+          </a:effectRef>
+          <a:fontRef idx="none"/>
+        </p:style>
+        <p:txBody>
+          <a:bodyPr rot="0" spcFirstLastPara="1" vertOverflow="overflow" horzOverflow="overflow" vert="horz" wrap="square" lIns="50800" tIns="50800" rIns="50800" bIns="50800" numCol="1" spcCol="38100" rtlCol="0" anchor="ctr">
+            <a:spAutoFit/>
+          </a:bodyPr>
+          <a:lstStyle/>
+          <a:p>
+            <a:pPr marL="457200" lvl="0" indent="-457200" algn="l">
+              <a:buFont typeface="Arial" panose="020B0604020202020204" pitchFamily="34" charset="0"/>
+              <a:buChar char="•"/>
+            </a:pPr>
+            <a:r>
+              <a:rPr lang="en-US" dirty="0"/>
+              <a:t>convert2annovar.pl -format vcf4 -</a:t>
+            </a:r>
+            <a:r>
+              <a:rPr lang="en-US" dirty="0" err="1"/>
+              <a:t>withfreq</a:t>
+            </a:r>
+            <a:r>
+              <a:rPr lang="en-US" dirty="0"/>
+              <a:t> data/indel.vcf &gt; data/</a:t>
+            </a:r>
+            <a:r>
+              <a:rPr lang="en-US" dirty="0" err="1"/>
+              <a:t>indel.avinput</a:t>
+            </a:r>
+            <a:endParaRPr lang="en-US" dirty="0"/>
+          </a:p>
+          <a:p>
+            <a:pPr marL="457200" indent="-457200" algn="l">
+              <a:buFont typeface="Arial" panose="020B0604020202020204" pitchFamily="34" charset="0"/>
+              <a:buChar char="•"/>
+            </a:pPr>
+            <a:r>
+              <a:rPr lang="en-US" dirty="0"/>
+              <a:t>convert2annovar.pl -format vcf4 -</a:t>
+            </a:r>
+            <a:r>
+              <a:rPr lang="en-US" dirty="0" err="1"/>
+              <a:t>withfreq</a:t>
+            </a:r>
+            <a:r>
+              <a:rPr lang="en-US" dirty="0"/>
+              <a:t> data/snp.vcf &gt; data/</a:t>
+            </a:r>
+            <a:r>
+              <a:rPr lang="en-US" dirty="0" err="1"/>
+              <a:t>snp.avinput</a:t>
+            </a:r>
+            <a:endParaRPr lang="en-US" dirty="0"/>
+          </a:p>
+          <a:p>
+            <a:pPr marL="457200" indent="-457200" algn="l">
+              <a:buFont typeface="Arial" panose="020B0604020202020204" pitchFamily="34" charset="0"/>
+              <a:buChar char="•"/>
+            </a:pPr>
+            <a:endParaRPr lang="en-US" dirty="0"/>
+          </a:p>
+          <a:p>
+            <a:pPr marL="457200" lvl="0" indent="-457200" algn="l">
+              <a:buFont typeface="Arial" panose="020B0604020202020204" pitchFamily="34" charset="0"/>
+              <a:buChar char="•"/>
+            </a:pPr>
+            <a:endParaRPr lang="en-US" dirty="0"/>
+          </a:p>
+        </p:txBody>
+      </p:sp>
+    </p:spTree>
+    <p:extLst>
+      <p:ext uri="{BB962C8B-B14F-4D97-AF65-F5344CB8AC3E}">
+        <p14:creationId xmlns:p14="http://schemas.microsoft.com/office/powerpoint/2010/main" val="644354701"/>
+      </p:ext>
+    </p:extLst>
+  </p:cSld>
+  <p:clrMapOvr>
+    <a:masterClrMapping/>
+  </p:clrMapOvr>
+  <p:transition spd="med"/>
+</p:sld>
+</file>
+
+<file path=ppt/slides/slide13.xml><?xml version="1.0" encoding="utf-8"?>
+<p:sld xmlns:a="http://schemas.openxmlformats.org/drawingml/2006/main" xmlns:r="http://schemas.openxmlformats.org/officeDocument/2006/relationships" xmlns:p="http://schemas.openxmlformats.org/presentationml/2006/main">
+  <p:cSld>
+    <p:spTree>
+      <p:nvGrpSpPr>
+        <p:cNvPr id="1" name=""/>
+        <p:cNvGrpSpPr/>
+        <p:nvPr/>
+      </p:nvGrpSpPr>
+      <p:grpSpPr>
+        <a:xfrm>
+          <a:off x="0" y="0"/>
+          <a:ext cx="0" cy="0"/>
+          <a:chOff x="0" y="0"/>
+          <a:chExt cx="0" cy="0"/>
+        </a:xfrm>
+      </p:grpSpPr>
+      <p:sp>
+        <p:nvSpPr>
+          <p:cNvPr id="2" name="Title 1"/>
+          <p:cNvSpPr>
+            <a:spLocks noGrp="1"/>
+          </p:cNvSpPr>
+          <p:nvPr>
+            <p:ph type="title"/>
+          </p:nvPr>
+        </p:nvSpPr>
+        <p:spPr>
+          <a:xfrm>
+            <a:off x="0" y="119482"/>
+            <a:ext cx="13004800" cy="1904468"/>
+          </a:xfrm>
+        </p:spPr>
+        <p:txBody>
+          <a:bodyPr/>
+          <a:lstStyle/>
+          <a:p>
+            <a:r>
+              <a:rPr lang="en-US" dirty="0"/>
+              <a:t>Analysis</a:t>
+            </a:r>
+            <a:endParaRPr lang="en-US" dirty="0"/>
+          </a:p>
+        </p:txBody>
+      </p:sp>
+      <p:sp>
+        <p:nvSpPr>
+          <p:cNvPr id="3" name="TextBox 2"/>
+          <p:cNvSpPr txBox="1"/>
+          <p:nvPr/>
+        </p:nvSpPr>
+        <p:spPr>
+          <a:xfrm>
+            <a:off x="0" y="3306664"/>
+            <a:ext cx="13004800" cy="2503249"/>
+          </a:xfrm>
+          <a:prstGeom prst="rect">
+            <a:avLst/>
+          </a:prstGeom>
+          <a:noFill/>
+          <a:ln w="12700" cap="flat">
+            <a:noFill/>
+            <a:miter lim="400000"/>
+          </a:ln>
+          <a:effectLst/>
+          <a:sp3d/>
+        </p:spPr>
+        <p:style>
+          <a:lnRef idx="0">
+            <a:scrgbClr r="0" g="0" b="0"/>
+          </a:lnRef>
+          <a:fillRef idx="0">
+            <a:scrgbClr r="0" g="0" b="0"/>
+          </a:fillRef>
+          <a:effectRef idx="0">
+            <a:scrgbClr r="0" g="0" b="0"/>
+          </a:effectRef>
+          <a:fontRef idx="none"/>
+        </p:style>
+        <p:txBody>
+          <a:bodyPr rot="0" spcFirstLastPara="1" vertOverflow="overflow" horzOverflow="overflow" vert="horz" wrap="square" lIns="50800" tIns="50800" rIns="50800" bIns="50800" numCol="1" spcCol="38100" rtlCol="0" anchor="ctr">
+            <a:spAutoFit/>
+          </a:bodyPr>
+          <a:lstStyle/>
+          <a:p>
+            <a:pPr marL="457200" lvl="0" indent="-457200" algn="l">
+              <a:buFont typeface="Arial" panose="020B0604020202020204" pitchFamily="34" charset="0"/>
+              <a:buChar char="•"/>
+            </a:pPr>
+            <a:r>
+              <a:rPr lang="en-US" dirty="0"/>
+              <a:t>annotate_variation.pl -filter -</a:t>
+            </a:r>
+            <a:r>
+              <a:rPr lang="en-US" dirty="0" err="1"/>
+              <a:t>dbtype</a:t>
+            </a:r>
+            <a:r>
+              <a:rPr lang="en-US" dirty="0"/>
+              <a:t> 1000g2015aug_all -</a:t>
+            </a:r>
+            <a:r>
+              <a:rPr lang="en-US" dirty="0" err="1"/>
+              <a:t>buildver</a:t>
+            </a:r>
+            <a:r>
+              <a:rPr lang="en-US" dirty="0"/>
+              <a:t> hg19 -out </a:t>
+            </a:r>
+            <a:r>
+              <a:rPr lang="en-US" dirty="0" err="1"/>
+              <a:t>indel</a:t>
+            </a:r>
+            <a:r>
+              <a:rPr lang="en-US" dirty="0"/>
+              <a:t> data/</a:t>
+            </a:r>
+            <a:r>
+              <a:rPr lang="en-US" dirty="0" err="1"/>
+              <a:t>indel.avinput</a:t>
+            </a:r>
+            <a:r>
+              <a:rPr lang="en-US" dirty="0"/>
+              <a:t> </a:t>
+            </a:r>
+            <a:r>
+              <a:rPr lang="en-US" dirty="0" err="1"/>
+              <a:t>humandb</a:t>
+            </a:r>
+            <a:r>
+              <a:rPr lang="en-US" dirty="0"/>
+              <a:t>/</a:t>
+            </a:r>
+          </a:p>
+          <a:p>
+            <a:pPr marL="457200" lvl="0" indent="-457200" algn="l">
+              <a:buFont typeface="Arial" panose="020B0604020202020204" pitchFamily="34" charset="0"/>
+              <a:buChar char="•"/>
+            </a:pPr>
+            <a:r>
+              <a:rPr lang="en-US" dirty="0"/>
+              <a:t>annotate_variation.pl -filter -</a:t>
+            </a:r>
+            <a:r>
+              <a:rPr lang="en-US" dirty="0" err="1"/>
+              <a:t>dbtype</a:t>
+            </a:r>
+            <a:r>
+              <a:rPr lang="en-US" dirty="0"/>
+              <a:t> hg19_gnomad_genome -</a:t>
+            </a:r>
+            <a:r>
+              <a:rPr lang="en-US" dirty="0" err="1"/>
+              <a:t>buildver</a:t>
+            </a:r>
+            <a:r>
+              <a:rPr lang="en-US" dirty="0"/>
+              <a:t> hg19 -out </a:t>
+            </a:r>
+            <a:r>
+              <a:rPr lang="en-US" dirty="0" err="1"/>
+              <a:t>snp.gad</a:t>
+            </a:r>
+            <a:r>
+              <a:rPr lang="en-US" dirty="0"/>
+              <a:t> data/</a:t>
+            </a:r>
+            <a:r>
+              <a:rPr lang="en-US" dirty="0" err="1"/>
+              <a:t>snp.avinput</a:t>
+            </a:r>
+            <a:r>
+              <a:rPr lang="en-US" dirty="0"/>
+              <a:t> </a:t>
+            </a:r>
+            <a:r>
+              <a:rPr lang="en-US" dirty="0" err="1"/>
+              <a:t>humandb</a:t>
+            </a:r>
+            <a:r>
+              <a:rPr lang="en-US" dirty="0"/>
+              <a:t>/</a:t>
+            </a:r>
+          </a:p>
+          <a:p>
+            <a:pPr marL="457200" indent="-457200" algn="l">
+              <a:buFont typeface="Arial" panose="020B0604020202020204" pitchFamily="34" charset="0"/>
+              <a:buChar char="•"/>
+            </a:pPr>
+            <a:endParaRPr lang="en-US" dirty="0"/>
+          </a:p>
+          <a:p>
+            <a:pPr marL="457200" lvl="0" indent="-457200" algn="l">
+              <a:buFont typeface="Arial" panose="020B0604020202020204" pitchFamily="34" charset="0"/>
+              <a:buChar char="•"/>
+            </a:pPr>
+            <a:endParaRPr lang="en-US" dirty="0"/>
+          </a:p>
+        </p:txBody>
+      </p:sp>
+    </p:spTree>
+    <p:extLst>
+      <p:ext uri="{BB962C8B-B14F-4D97-AF65-F5344CB8AC3E}">
+        <p14:creationId xmlns:p14="http://schemas.microsoft.com/office/powerpoint/2010/main" val="597153960"/>
+      </p:ext>
+    </p:extLst>
+  </p:cSld>
+  <p:clrMapOvr>
+    <a:masterClrMapping/>
+  </p:clrMapOvr>
+  <p:transition spd="med"/>
+</p:sld>
+</file>
+
+<file path=ppt/slides/slide14.xml><?xml version="1.0" encoding="utf-8"?>
+<p:sld xmlns:a="http://schemas.openxmlformats.org/drawingml/2006/main" xmlns:r="http://schemas.openxmlformats.org/officeDocument/2006/relationships" xmlns:p="http://schemas.openxmlformats.org/presentationml/2006/main">
+  <p:cSld>
+    <p:spTree>
+      <p:nvGrpSpPr>
+        <p:cNvPr id="1" name=""/>
+        <p:cNvGrpSpPr/>
+        <p:nvPr/>
+      </p:nvGrpSpPr>
+      <p:grpSpPr>
+        <a:xfrm>
+          <a:off x="0" y="0"/>
+          <a:ext cx="0" cy="0"/>
+          <a:chOff x="0" y="0"/>
+          <a:chExt cx="0" cy="0"/>
+        </a:xfrm>
+      </p:grpSpPr>
+      <p:sp>
+        <p:nvSpPr>
           <p:cNvPr id="26" name="Shape 890"/>
           <p:cNvSpPr/>
           <p:nvPr/>
@@ -5696,7 +6457,7 @@
           </a:ln>
           <a:extLst>
             <a:ext uri="{C572A759-6A51-4108-AA02-DFA0A04FC94B}">
-              <ma14:wrappingTextBoxFlag xmlns:ma14="http://schemas.microsoft.com/office/mac/drawingml/2011/main" val="1"/>
+              <ma14:wrappingTextBoxFlag xmlns:ma14="http://schemas.microsoft.com/office/mac/drawingml/2011/main" xmlns="" val="1"/>
             </a:ext>
           </a:extLst>
         </p:spPr>
@@ -5712,7 +6473,7 @@
               </a:defRPr>
             </a:pPr>
             <a:r>
-              <a:rPr lang="en-US" dirty="0" smtClean="0"/>
+              <a:rPr lang="en-US" dirty="0"/>
               <a:t>sample allele frequencies</a:t>
             </a:r>
             <a:endParaRPr dirty="0">
@@ -5758,17 +6519,10 @@
   <p:clrMapOvr>
     <a:masterClrMapping/>
   </p:clrMapOvr>
-  <p:timing>
-    <p:tnLst>
-      <p:par>
-        <p:cTn id="1" dur="indefinite" restart="never" nodeType="tmRoot"/>
-      </p:par>
-    </p:tnLst>
-  </p:timing>
 </p:sld>
 </file>
 
-<file path=ppt/slides/slide11.xml><?xml version="1.0" encoding="utf-8"?>
+<file path=ppt/slides/slide15.xml><?xml version="1.0" encoding="utf-8"?>
 <p:sld xmlns:a="http://schemas.openxmlformats.org/drawingml/2006/main" xmlns:r="http://schemas.openxmlformats.org/officeDocument/2006/relationships" xmlns:p="http://schemas.openxmlformats.org/presentationml/2006/main">
   <p:cSld>
     <p:spTree>
@@ -5807,7 +6561,7 @@
           </a:ln>
           <a:extLst>
             <a:ext uri="{C572A759-6A51-4108-AA02-DFA0A04FC94B}">
-              <ma14:wrappingTextBoxFlag xmlns:ma14="http://schemas.microsoft.com/office/mac/drawingml/2011/main" val="1"/>
+              <ma14:wrappingTextBoxFlag xmlns:ma14="http://schemas.microsoft.com/office/mac/drawingml/2011/main" xmlns="" val="1"/>
             </a:ext>
           </a:extLst>
         </p:spPr>
@@ -5823,7 +6577,7 @@
               </a:defRPr>
             </a:pPr>
             <a:r>
-              <a:rPr lang="en-US" dirty="0" smtClean="0"/>
+              <a:rPr lang="en-US" dirty="0"/>
               <a:t>sample allele frequencies</a:t>
             </a:r>
             <a:endParaRPr dirty="0">
@@ -5904,30 +6658,9 @@
               <a:buChar char="•"/>
             </a:pPr>
             <a:r>
-              <a:rPr lang="en-US" dirty="0" smtClean="0"/>
-              <a:t>Proportion of private </a:t>
-            </a:r>
-            <a:r>
               <a:rPr lang="en-US" dirty="0"/>
-              <a:t>variants </a:t>
-            </a:r>
-            <a:r>
-              <a:rPr lang="en-US" dirty="0" smtClean="0"/>
-              <a:t>is different </a:t>
-            </a:r>
-            <a:r>
-              <a:rPr lang="en-US" dirty="0"/>
-              <a:t>by 2.5% and 30% for SNPs and indels, respectively, </a:t>
-            </a:r>
-            <a:r>
-              <a:rPr lang="en-US" dirty="0" smtClean="0"/>
-              <a:t>when </a:t>
-            </a:r>
-            <a:r>
-              <a:rPr lang="en-US" dirty="0"/>
-              <a:t>comparing 1000genome to gnomAD. </a:t>
-            </a:r>
-            <a:endParaRPr lang="en-US" dirty="0" smtClean="0"/>
+              <a:t>Proportion of private variants is different by 2.5% and 30% for SNPs and indels, respectively, when comparing 1000genome to gnomAD. </a:t>
+            </a:r>
           </a:p>
           <a:p>
             <a:pPr marL="457200" indent="-457200" algn="l">
@@ -5935,12 +6668,8 @@
               <a:buChar char="•"/>
             </a:pPr>
             <a:r>
-              <a:rPr lang="en-US" dirty="0" smtClean="0"/>
-              <a:t>gnomAD </a:t>
-            </a:r>
-            <a:r>
               <a:rPr lang="en-US" dirty="0"/>
-              <a:t>contains much more variants, as we expect, since it comes from a much larger cohort.</a:t>
+              <a:t>gnomAD contains much more variants, as we expect, since it comes from a much larger cohort.</a:t>
             </a:r>
             <a:endParaRPr kumimoji="0" lang="en-US" sz="2600" b="0" i="0" u="none" strike="noStrike" cap="none" spc="0" normalizeH="0" baseline="0" dirty="0">
               <a:ln>
@@ -5969,17 +6698,10 @@
   <p:clrMapOvr>
     <a:masterClrMapping/>
   </p:clrMapOvr>
-  <p:timing>
-    <p:tnLst>
-      <p:par>
-        <p:cTn id="1" dur="indefinite" restart="never" nodeType="tmRoot"/>
-      </p:par>
-    </p:tnLst>
-  </p:timing>
 </p:sld>
 </file>
 
-<file path=ppt/slides/slide12.xml><?xml version="1.0" encoding="utf-8"?>
+<file path=ppt/slides/slide16.xml><?xml version="1.0" encoding="utf-8"?>
 <p:sld xmlns:a="http://schemas.openxmlformats.org/drawingml/2006/main" xmlns:r="http://schemas.openxmlformats.org/officeDocument/2006/relationships" xmlns:p="http://schemas.openxmlformats.org/presentationml/2006/main">
   <p:cSld>
     <p:spTree>
@@ -6023,7 +6745,7 @@
           <a:lstStyle/>
           <a:p>
             <a:r>
-              <a:rPr lang="en-US" dirty="0" smtClean="0"/>
+              <a:rPr lang="en-US" dirty="0"/>
               <a:t>summary</a:t>
             </a:r>
             <a:endParaRPr dirty="0"/>
@@ -6061,7 +6783,7 @@
               <a:buAutoNum type="arabicPeriod"/>
             </a:pPr>
             <a:r>
-              <a:rPr lang="en-US" sz="3600" dirty="0" smtClean="0">
+              <a:rPr lang="en-US" sz="3600" dirty="0">
                 <a:solidFill>
                   <a:schemeClr val="tx1"/>
                 </a:solidFill>
@@ -6080,7 +6802,7 @@
               <a:buAutoNum type="arabicPeriod"/>
             </a:pPr>
             <a:r>
-              <a:rPr lang="en-US" sz="3600" dirty="0" err="1" smtClean="0">
+              <a:rPr lang="en-US" sz="3600" dirty="0" err="1">
                 <a:solidFill>
                   <a:schemeClr val="tx1"/>
                 </a:solidFill>
@@ -6088,7 +6810,7 @@
               <a:t>vcfR</a:t>
             </a:r>
             <a:r>
-              <a:rPr lang="en-US" sz="3600" dirty="0" smtClean="0">
+              <a:rPr lang="en-US" sz="3600" dirty="0">
                 <a:solidFill>
                   <a:schemeClr val="tx1"/>
                 </a:solidFill>
@@ -6102,7 +6824,7 @@
               <a:buAutoNum type="arabicPeriod"/>
             </a:pPr>
             <a:r>
-              <a:rPr lang="en-US" sz="3600" dirty="0" smtClean="0"/>
+              <a:rPr lang="en-US" sz="3600" dirty="0"/>
               <a:t>ANNOVAR retrieves genome frequencies and annotations </a:t>
             </a:r>
             <a:endParaRPr lang="en-US" sz="3600" dirty="0">
@@ -6129,7 +6851,7 @@
           </a:prstGeom>
           <a:extLst>
             <a:ext uri="{C572A759-6A51-4108-AA02-DFA0A04FC94B}">
-              <ma14:wrappingTextBoxFlag xmlns:ma14="http://schemas.microsoft.com/office/mac/drawingml/2011/main" val="1"/>
+              <ma14:wrappingTextBoxFlag xmlns:ma14="http://schemas.microsoft.com/office/mac/drawingml/2011/main" xmlns="" val="1"/>
             </a:ext>
           </a:extLst>
         </p:spPr>
@@ -6140,7 +6862,7 @@
           <a:lstStyle/>
           <a:p>
             <a:fld id="{86CB4B4D-7CA3-9044-876B-883B54F8677D}" type="slidenum">
-              <a:t>12</a:t>
+              <a:t>16</a:t>
             </a:fld>
             <a:endParaRPr/>
           </a:p>
@@ -6152,13 +6874,6 @@
     <a:masterClrMapping/>
   </p:clrMapOvr>
   <p:transition spd="slow"/>
-  <p:timing>
-    <p:tnLst>
-      <p:par>
-        <p:cTn id="1" dur="indefinite" restart="never" nodeType="tmRoot"/>
-      </p:par>
-    </p:tnLst>
-  </p:timing>
 </p:sld>
 </file>
 
@@ -6231,7 +6946,7 @@
           </a:prstGeom>
           <a:extLst>
             <a:ext uri="{C572A759-6A51-4108-AA02-DFA0A04FC94B}">
-              <ma14:wrappingTextBoxFlag xmlns:ma14="http://schemas.microsoft.com/office/mac/drawingml/2011/main" val="1"/>
+              <ma14:wrappingTextBoxFlag xmlns:ma14="http://schemas.microsoft.com/office/mac/drawingml/2011/main" xmlns="" val="1"/>
             </a:ext>
           </a:extLst>
         </p:spPr>
@@ -6267,7 +6982,7 @@
           </a:ln>
           <a:extLst>
             <a:ext uri="{C572A759-6A51-4108-AA02-DFA0A04FC94B}">
-              <ma14:wrappingTextBoxFlag xmlns:ma14="http://schemas.microsoft.com/office/mac/drawingml/2011/main" val="1"/>
+              <ma14:wrappingTextBoxFlag xmlns:ma14="http://schemas.microsoft.com/office/mac/drawingml/2011/main" xmlns="" val="1"/>
             </a:ext>
           </a:extLst>
         </p:spPr>
@@ -6285,15 +7000,11 @@
               <a:buAutoNum type="arabicPeriod"/>
             </a:pPr>
             <a:r>
-              <a:rPr lang="en-US" sz="4400" dirty="0" smtClean="0"/>
-              <a:t> introduction </a:t>
-            </a:r>
-            <a:r>
-              <a:rPr lang="en-US" sz="4400" dirty="0" smtClean="0"/>
-              <a:t>to </a:t>
-            </a:r>
-            <a:r>
-              <a:rPr lang="en-US" sz="4400" b="1" dirty="0" smtClean="0">
+              <a:rPr lang="en-US" sz="4400" dirty="0"/>
+              <a:t> introduction to </a:t>
+            </a:r>
+            <a:r>
+              <a:rPr lang="en-US" sz="4400" b="1" dirty="0">
                 <a:solidFill>
                   <a:schemeClr val="accent6">
                     <a:satOff val="24555"/>
@@ -6307,23 +7018,8 @@
               </a:rPr>
               <a:t>genomic databases</a:t>
             </a:r>
-            <a:r>
-              <a:rPr sz="4400" dirty="0" smtClean="0">
-                <a:solidFill>
-                  <a:schemeClr val="accent6">
-                    <a:satOff val="24555"/>
-                    <a:lumOff val="22232"/>
-                  </a:schemeClr>
-                </a:solidFill>
-                <a:latin typeface="Myriad Pro Semibold"/>
-                <a:ea typeface="Myriad Pro Semibold"/>
-                <a:cs typeface="Myriad Pro Semibold"/>
-                <a:sym typeface="Myriad Pro Semibold"/>
-              </a:rPr>
-              <a:t/>
-            </a:r>
             <a:br>
-              <a:rPr sz="4400" dirty="0" smtClean="0">
+              <a:rPr sz="4400" dirty="0">
                 <a:solidFill>
                   <a:schemeClr val="accent6">
                     <a:satOff val="24555"/>
@@ -6358,11 +7054,11 @@
               <a:buAutoNum type="arabicPeriod"/>
             </a:pPr>
             <a:r>
-              <a:rPr lang="en-US" sz="4400" dirty="0" smtClean="0"/>
+              <a:rPr lang="en-US" sz="4400" dirty="0"/>
               <a:t> retrieving </a:t>
             </a:r>
             <a:r>
-              <a:rPr lang="en-US" sz="4400" b="1" dirty="0" smtClean="0">
+              <a:rPr lang="en-US" sz="4400" b="1" dirty="0">
                 <a:solidFill>
                   <a:schemeClr val="accent3">
                     <a:lumMod val="75000"/>
@@ -6376,11 +7072,11 @@
               <a:t>annotations </a:t>
             </a:r>
             <a:r>
-              <a:rPr lang="en-US" sz="4400" dirty="0" smtClean="0"/>
+              <a:rPr lang="en-US" sz="4400" dirty="0"/>
               <a:t>for variants</a:t>
             </a:r>
             <a:br>
-              <a:rPr lang="en-US" sz="4400" dirty="0" smtClean="0"/>
+              <a:rPr lang="en-US" sz="4400" dirty="0"/>
             </a:br>
             <a:endParaRPr lang="en-US" sz="4400" dirty="0"/>
           </a:p>
@@ -6393,11 +7089,11 @@
               <a:buAutoNum type="arabicPeriod"/>
             </a:pPr>
             <a:r>
-              <a:rPr lang="en-US" sz="4400" dirty="0" smtClean="0"/>
+              <a:rPr lang="en-US" sz="4400" dirty="0"/>
               <a:t> retrieving </a:t>
             </a:r>
             <a:r>
-              <a:rPr lang="en-US" sz="4400" b="1" dirty="0" smtClean="0">
+              <a:rPr lang="en-US" sz="4400" b="1" dirty="0">
                 <a:solidFill>
                   <a:srgbClr val="50A8FA"/>
                 </a:solidFill>
@@ -6405,16 +7101,8 @@
               <a:t>population frequencies </a:t>
             </a:r>
             <a:r>
-              <a:rPr lang="en-US" sz="4400" dirty="0" smtClean="0"/>
+              <a:rPr lang="en-US" sz="4400" dirty="0"/>
               <a:t>for variants</a:t>
-            </a:r>
-            <a:r>
-              <a:rPr sz="4400" dirty="0">
-                <a:solidFill>
-                  <a:srgbClr val="FF0000"/>
-                </a:solidFill>
-              </a:rPr>
-              <a:t/>
             </a:r>
             <a:br>
               <a:rPr sz="4400" dirty="0">
@@ -6423,14 +7111,6 @@
                 </a:solidFill>
               </a:rPr>
             </a:br>
-            <a:r>
-              <a:rPr sz="4400" dirty="0">
-                <a:solidFill>
-                  <a:srgbClr val="FF0000"/>
-                </a:solidFill>
-              </a:rPr>
-              <a:t/>
-            </a:r>
             <a:br>
               <a:rPr sz="4400" dirty="0">
                 <a:solidFill>
@@ -6452,13 +7132,6 @@
     <a:masterClrMapping/>
   </p:clrMapOvr>
   <p:transition spd="slow"/>
-  <p:timing>
-    <p:tnLst>
-      <p:par>
-        <p:cTn id="1" dur="indefinite" restart="never" nodeType="tmRoot"/>
-      </p:par>
-    </p:tnLst>
-  </p:timing>
 </p:sld>
 </file>
 
@@ -6506,14 +7179,10 @@
           <a:p>
             <a:r>
               <a:rPr dirty="0"/>
-              <a:t>1  | </a:t>
-            </a:r>
-            <a:r>
-              <a:rPr dirty="0" smtClean="0"/>
-              <a:t> </a:t>
-            </a:r>
-            <a:r>
-              <a:rPr lang="en-US" dirty="0" smtClean="0"/>
+              <a:t>1  |  </a:t>
+            </a:r>
+            <a:r>
+              <a:rPr lang="en-US" dirty="0"/>
               <a:t>introduction to genomic databases</a:t>
             </a:r>
             <a:endParaRPr dirty="0"/>
@@ -6540,7 +7209,7 @@
           </a:prstGeom>
           <a:extLst>
             <a:ext uri="{C572A759-6A51-4108-AA02-DFA0A04FC94B}">
-              <ma14:wrappingTextBoxFlag xmlns:ma14="http://schemas.microsoft.com/office/mac/drawingml/2011/main" val="1"/>
+              <ma14:wrappingTextBoxFlag xmlns:ma14="http://schemas.microsoft.com/office/mac/drawingml/2011/main" xmlns="" val="1"/>
             </a:ext>
           </a:extLst>
         </p:spPr>
@@ -6563,13 +7232,6 @@
     <a:masterClrMapping/>
   </p:clrMapOvr>
   <p:transition spd="slow"/>
-  <p:timing>
-    <p:tnLst>
-      <p:par>
-        <p:cTn id="1" dur="indefinite" restart="never" nodeType="tmRoot"/>
-      </p:par>
-    </p:tnLst>
-  </p:timing>
 </p:sld>
 </file>
 
@@ -6615,7 +7277,7 @@
           </a:ln>
           <a:extLst>
             <a:ext uri="{C572A759-6A51-4108-AA02-DFA0A04FC94B}">
-              <ma14:wrappingTextBoxFlag xmlns:ma14="http://schemas.microsoft.com/office/mac/drawingml/2011/main" val="1"/>
+              <ma14:wrappingTextBoxFlag xmlns:ma14="http://schemas.microsoft.com/office/mac/drawingml/2011/main" xmlns="" val="1"/>
             </a:ext>
           </a:extLst>
         </p:spPr>
@@ -6632,7 +7294,7 @@
           </a:lstStyle>
           <a:p>
             <a:r>
-              <a:rPr lang="en-US" dirty="0" smtClean="0"/>
+              <a:rPr lang="en-US" dirty="0"/>
               <a:t>human genetic variation</a:t>
             </a:r>
             <a:endParaRPr dirty="0"/>
@@ -6660,7 +7322,7 @@
         </p:spPr>
         <p:txBody>
           <a:bodyPr anchor="t">
-            <a:normAutofit/>
+            <a:normAutofit lnSpcReduction="10000"/>
           </a:bodyPr>
           <a:lstStyle/>
           <a:p>
@@ -6676,11 +7338,11 @@
               </a:defRPr>
             </a:pPr>
             <a:r>
-              <a:rPr lang="en-US" b="1" dirty="0" smtClean="0"/>
+              <a:rPr lang="en-US" b="1" dirty="0"/>
               <a:t>Reference genetic variation:</a:t>
             </a:r>
             <a:r>
-              <a:rPr lang="en-US" dirty="0" smtClean="0"/>
+              <a:rPr lang="en-US" dirty="0"/>
               <a:t> catalogues the “normal” range of variation in human genomes</a:t>
             </a:r>
           </a:p>
@@ -6768,13 +7430,6 @@
     <a:masterClrMapping/>
   </p:clrMapOvr>
   <p:transition spd="slow"/>
-  <p:timing>
-    <p:tnLst>
-      <p:par>
-        <p:cTn id="1" dur="indefinite" restart="never" nodeType="tmRoot"/>
-      </p:par>
-    </p:tnLst>
-  </p:timing>
 </p:sld>
 </file>
 
@@ -6820,7 +7475,7 @@
           </a:ln>
           <a:extLst>
             <a:ext uri="{C572A759-6A51-4108-AA02-DFA0A04FC94B}">
-              <ma14:wrappingTextBoxFlag xmlns:ma14="http://schemas.microsoft.com/office/mac/drawingml/2011/main" val="1"/>
+              <ma14:wrappingTextBoxFlag xmlns:ma14="http://schemas.microsoft.com/office/mac/drawingml/2011/main" xmlns="" val="1"/>
             </a:ext>
           </a:extLst>
         </p:spPr>
@@ -6838,11 +7493,7 @@
           <a:p>
             <a:r>
               <a:rPr lang="en-US" dirty="0"/>
-              <a:t>g</a:t>
-            </a:r>
-            <a:r>
-              <a:rPr lang="en-US" dirty="0" smtClean="0"/>
-              <a:t>enomic databases</a:t>
+              <a:t>genomic databases</a:t>
             </a:r>
             <a:endParaRPr dirty="0"/>
           </a:p>
@@ -6869,7 +7520,7 @@
         </p:spPr>
         <p:txBody>
           <a:bodyPr anchor="t">
-            <a:normAutofit/>
+            <a:normAutofit fontScale="92500"/>
           </a:bodyPr>
           <a:lstStyle/>
           <a:p>
@@ -6885,22 +7536,14 @@
               </a:defRPr>
             </a:pPr>
             <a:r>
-              <a:rPr lang="en-US" b="1" dirty="0" smtClean="0"/>
-              <a:t>1000 </a:t>
-            </a:r>
-            <a:r>
               <a:rPr lang="en-US" b="1" dirty="0"/>
-              <a:t>Genomes </a:t>
-            </a:r>
-            <a:r>
-              <a:rPr lang="en-US" b="1" dirty="0" smtClean="0"/>
-              <a:t>Project (1KGP):</a:t>
-            </a:r>
-            <a:r>
-              <a:rPr lang="en-US" dirty="0" smtClean="0"/>
+              <a:t>1000 Genomes Project (1KGP):</a:t>
+            </a:r>
+            <a:r>
+              <a:rPr lang="en-US" dirty="0"/>
               <a:t> individual-level genomes (2,504)</a:t>
             </a:r>
-            <a:endParaRPr lang="en-US" b="1" dirty="0" smtClean="0"/>
+            <a:endParaRPr lang="en-US" b="1" dirty="0"/>
           </a:p>
           <a:p>
             <a:pPr marL="0" indent="0">
@@ -6915,19 +7558,19 @@
               </a:defRPr>
             </a:pPr>
             <a:r>
-              <a:rPr lang="en-US" b="1" dirty="0" smtClean="0"/>
+              <a:rPr lang="en-US" b="1" dirty="0"/>
               <a:t>Exome Sequencing Project: </a:t>
             </a:r>
             <a:r>
-              <a:rPr lang="en-US" dirty="0" smtClean="0"/>
+              <a:rPr lang="en-US" dirty="0"/>
               <a:t>aggregated</a:t>
             </a:r>
             <a:r>
-              <a:rPr lang="en-US" b="1" dirty="0" smtClean="0"/>
+              <a:rPr lang="en-US" b="1" dirty="0"/>
               <a:t> </a:t>
             </a:r>
             <a:r>
-              <a:rPr lang="en-US" dirty="0" smtClean="0"/>
+              <a:rPr lang="en-US" dirty="0"/>
               <a:t>population-level exomes (6,515)</a:t>
             </a:r>
           </a:p>
@@ -6944,38 +7587,30 @@
               </a:defRPr>
             </a:pPr>
             <a:r>
-              <a:rPr lang="en-US" b="1" dirty="0" smtClean="0"/>
+              <a:rPr lang="en-US" b="1" dirty="0"/>
               <a:t>Exome Aggregation Consortium (ExAC): </a:t>
             </a:r>
             <a:r>
-              <a:rPr lang="en-US" dirty="0" smtClean="0"/>
+              <a:rPr lang="en-US" dirty="0"/>
               <a:t>more</a:t>
             </a:r>
             <a:r>
-              <a:rPr lang="en-US" b="1" dirty="0" smtClean="0"/>
+              <a:rPr lang="en-US" b="1" dirty="0"/>
               <a:t> </a:t>
             </a:r>
             <a:r>
-              <a:rPr lang="en-US" dirty="0" smtClean="0"/>
+              <a:rPr lang="en-US" dirty="0"/>
               <a:t>aggregated</a:t>
             </a:r>
             <a:r>
-              <a:rPr lang="en-US" b="1" dirty="0" smtClean="0"/>
+              <a:rPr lang="en-US" b="1" dirty="0"/>
               <a:t> </a:t>
             </a:r>
             <a:r>
-              <a:rPr lang="en-US" dirty="0" smtClean="0"/>
-              <a:t>population-level </a:t>
-            </a:r>
-            <a:r>
               <a:rPr lang="en-US" dirty="0"/>
-              <a:t>exomes </a:t>
-            </a:r>
-            <a:r>
-              <a:rPr lang="en-US" dirty="0" smtClean="0"/>
-              <a:t>(60,706)</a:t>
-            </a:r>
-            <a:endParaRPr lang="en-US" b="1" dirty="0" smtClean="0"/>
+              <a:t>population-level exomes (60,706)</a:t>
+            </a:r>
+            <a:endParaRPr lang="en-US" b="1" dirty="0"/>
           </a:p>
           <a:p>
             <a:pPr marL="0" indent="0">
@@ -6990,14 +7625,14 @@
               </a:defRPr>
             </a:pPr>
             <a:r>
-              <a:rPr lang="en-US" b="1" dirty="0" smtClean="0"/>
+              <a:rPr lang="en-US" b="1" dirty="0"/>
               <a:t>Genome Aggregation Database (gnomAD): </a:t>
             </a:r>
             <a:r>
-              <a:rPr lang="en-US" dirty="0" smtClean="0"/>
+              <a:rPr lang="en-US" dirty="0"/>
               <a:t>update to ExAC; even more population-level exomes and genomes (138,632)</a:t>
             </a:r>
-            <a:endParaRPr lang="en-US" dirty="0" smtClean="0">
+            <a:endParaRPr lang="en-US" dirty="0">
               <a:solidFill>
                 <a:schemeClr val="accent2"/>
               </a:solidFill>
@@ -7064,13 +7699,6 @@
     <a:masterClrMapping/>
   </p:clrMapOvr>
   <p:transition spd="slow"/>
-  <p:timing>
-    <p:tnLst>
-      <p:par>
-        <p:cTn id="1" dur="indefinite" restart="never" nodeType="tmRoot"/>
-      </p:par>
-    </p:tnLst>
-  </p:timing>
 </p:sld>
 </file>
 
@@ -7114,15 +7742,15 @@
           <a:lstStyle/>
           <a:p>
             <a:r>
-              <a:rPr lang="en-US" dirty="0" smtClean="0"/>
+              <a:rPr lang="en-US" dirty="0"/>
               <a:t>2</a:t>
             </a:r>
             <a:r>
-              <a:rPr dirty="0" smtClean="0"/>
+              <a:rPr dirty="0"/>
               <a:t>  |  </a:t>
             </a:r>
             <a:r>
-              <a:rPr lang="en-US" dirty="0" smtClean="0"/>
+              <a:rPr lang="en-US" dirty="0"/>
               <a:t>retrieving annotations for variants</a:t>
             </a:r>
             <a:endParaRPr dirty="0"/>
@@ -7145,7 +7773,7 @@
           </a:prstGeom>
           <a:extLst>
             <a:ext uri="{C572A759-6A51-4108-AA02-DFA0A04FC94B}">
-              <ma14:wrappingTextBoxFlag xmlns:ma14="http://schemas.microsoft.com/office/mac/drawingml/2011/main" val="1"/>
+              <ma14:wrappingTextBoxFlag xmlns:ma14="http://schemas.microsoft.com/office/mac/drawingml/2011/main" xmlns="" val="1"/>
             </a:ext>
           </a:extLst>
         </p:spPr>
@@ -7168,13 +7796,6 @@
     <a:masterClrMapping/>
   </p:clrMapOvr>
   <p:transition spd="slow"/>
-  <p:timing>
-    <p:tnLst>
-      <p:par>
-        <p:cTn id="1" dur="indefinite" restart="never" nodeType="tmRoot"/>
-      </p:par>
-    </p:tnLst>
-  </p:timing>
 </p:sld>
 </file>
 
@@ -7211,7 +7832,7 @@
           </a:prstGeom>
           <a:extLst>
             <a:ext uri="{C572A759-6A51-4108-AA02-DFA0A04FC94B}">
-              <ma14:wrappingTextBoxFlag xmlns:ma14="http://schemas.microsoft.com/office/mac/drawingml/2011/main" val="1"/>
+              <ma14:wrappingTextBoxFlag xmlns:ma14="http://schemas.microsoft.com/office/mac/drawingml/2011/main" xmlns="" val="1"/>
             </a:ext>
           </a:extLst>
         </p:spPr>
@@ -7250,7 +7871,7 @@
           </a:ln>
           <a:extLst>
             <a:ext uri="{C572A759-6A51-4108-AA02-DFA0A04FC94B}">
-              <ma14:wrappingTextBoxFlag xmlns:ma14="http://schemas.microsoft.com/office/mac/drawingml/2011/main" val="1"/>
+              <ma14:wrappingTextBoxFlag xmlns:ma14="http://schemas.microsoft.com/office/mac/drawingml/2011/main" xmlns="" val="1"/>
             </a:ext>
           </a:extLst>
         </p:spPr>
@@ -7267,11 +7888,11 @@
           </a:lstStyle>
           <a:p>
             <a:r>
-              <a:rPr lang="en-US" dirty="0" err="1" smtClean="0"/>
+              <a:rPr lang="en-US" dirty="0" err="1"/>
               <a:t>vcfR</a:t>
             </a:r>
             <a:r>
-              <a:rPr lang="en-US" dirty="0" smtClean="0"/>
+              <a:rPr lang="en-US" dirty="0"/>
               <a:t>: query tool</a:t>
             </a:r>
             <a:endParaRPr dirty="0"/>
@@ -7381,13 +8002,6 @@
     <a:masterClrMapping/>
   </p:clrMapOvr>
   <p:transition spd="slow"/>
-  <p:timing>
-    <p:tnLst>
-      <p:par>
-        <p:cTn id="1" dur="indefinite" restart="never" nodeType="tmRoot"/>
-      </p:par>
-    </p:tnLst>
-  </p:timing>
 </p:sld>
 </file>
 
@@ -7431,11 +8045,11 @@
           <a:lstStyle/>
           <a:p>
             <a:r>
-              <a:rPr lang="en-US" dirty="0" smtClean="0"/>
+              <a:rPr lang="en-US" dirty="0"/>
               <a:t>results from </a:t>
             </a:r>
             <a:r>
-              <a:rPr lang="en-US" dirty="0" err="1" smtClean="0"/>
+              <a:rPr lang="en-US" dirty="0" err="1"/>
               <a:t>vcfR</a:t>
             </a:r>
             <a:endParaRPr dirty="0"/>
@@ -7448,13 +8062,6 @@
     <a:masterClrMapping/>
   </p:clrMapOvr>
   <p:transition spd="slow"/>
-  <p:timing>
-    <p:tnLst>
-      <p:par>
-        <p:cTn id="1" dur="indefinite" restart="never" nodeType="tmRoot"/>
-      </p:par>
-    </p:tnLst>
-  </p:timing>
 </p:sld>
 </file>
 
@@ -7502,15 +8109,11 @@
               <a:t>3</a:t>
             </a:r>
             <a:r>
-              <a:rPr dirty="0" smtClean="0"/>
-              <a:t>  </a:t>
-            </a:r>
-            <a:r>
               <a:rPr dirty="0"/>
-              <a:t>| </a:t>
-            </a:r>
-            <a:r>
-              <a:rPr lang="en-US" dirty="0" smtClean="0"/>
+              <a:t>  | </a:t>
+            </a:r>
+            <a:r>
+              <a:rPr lang="en-US" dirty="0"/>
               <a:t>retrieving population frequencies for variants</a:t>
             </a:r>
             <a:endParaRPr dirty="0">
@@ -7537,7 +8140,7 @@
           </a:prstGeom>
           <a:extLst>
             <a:ext uri="{C572A759-6A51-4108-AA02-DFA0A04FC94B}">
-              <ma14:wrappingTextBoxFlag xmlns:ma14="http://schemas.microsoft.com/office/mac/drawingml/2011/main" val="1"/>
+              <ma14:wrappingTextBoxFlag xmlns:ma14="http://schemas.microsoft.com/office/mac/drawingml/2011/main" xmlns="" val="1"/>
             </a:ext>
           </a:extLst>
         </p:spPr>
@@ -7565,13 +8168,6 @@
     <a:masterClrMapping/>
   </p:clrMapOvr>
   <p:transition spd="slow"/>
-  <p:timing>
-    <p:tnLst>
-      <p:par>
-        <p:cTn id="1" dur="indefinite" restart="never" nodeType="tmRoot"/>
-      </p:par>
-    </p:tnLst>
-  </p:timing>
 </p:sld>
 </file>
 

</xml_diff>